<commit_message>
Updated Questionnaire example with population information
</commit_message>
<xml_diff>
--- a/presentations/2023-10 Webinars/2023-10 Questionnaire and SDC.pptx
+++ b/presentations/2023-10 Webinars/2023-10 Questionnaire and SDC.pptx
@@ -321,7 +321,7 @@
             <a:fld id="{1BCE7D1B-E2D6-42EC-A46F-6B8D8AB722EA}" type="datetime1">
               <a:rPr lang="en-US" altLang="en-US"/>
               <a:pPr/>
-              <a:t>10/22/2023</a:t>
+              <a:t>10/25/2023</a:t>
             </a:fld>
             <a:endParaRPr lang="en-US" altLang="en-US"/>
           </a:p>
@@ -552,7 +552,7 @@
             <a:fld id="{60D4D74E-7671-46E5-9A5B-14F31A4C0D2E}" type="datetime1">
               <a:rPr lang="en-US" altLang="en-US"/>
               <a:pPr/>
-              <a:t>10/22/2023</a:t>
+              <a:t>10/24/2023</a:t>
             </a:fld>
             <a:endParaRPr lang="en-US" altLang="en-US"/>
           </a:p>
@@ -24624,7 +24624,7 @@
                   <a:srgbClr val="F2F2F2"/>
                 </a:highlight>
               </a:rPr>
-              <a:t>	&amp;status=</a:t>
+              <a:t>	&amp;</a:t>
             </a:r>
             <a:r>
               <a:rPr lang="fr-FR" sz="1200" dirty="0" err="1">
@@ -24632,7 +24632,15 @@
                   <a:srgbClr val="F2F2F2"/>
                 </a:highlight>
               </a:rPr>
-              <a:t>completed</a:t>
+              <a:t>status</a:t>
+            </a:r>
+            <a:r>
+              <a:rPr lang="fr-FR" sz="1200">
+                <a:highlight>
+                  <a:srgbClr val="F2F2F2"/>
+                </a:highlight>
+              </a:rPr>
+              <a:t>=final</a:t>
             </a:r>
             <a:endParaRPr lang="fr-FR" sz="1200" dirty="0">
               <a:highlight>

</xml_diff>